<commit_message>
TOM 18 neue Lizenzen eingepflegt
</commit_message>
<xml_diff>
--- a/training-cards/music moves/Tomatoes (TOM)/ger/journeyman/ger_TOM_18_Aufdrehen_fertig_los_MM_J.pptx
+++ b/training-cards/music moves/Tomatoes (TOM)/ger/journeyman/ger_TOM_18_Aufdrehen_fertig_los_MM_J.pptx
@@ -105,6 +105,22 @@
       </a:defRPr>
     </a:lvl9pPr>
   </p:defaultTextStyle>
+  <p:extLst>
+    <p:ext uri="{EFAFB233-063F-42B5-8137-9DF3F51BA10A}">
+      <p15:sldGuideLst xmlns:p15="http://schemas.microsoft.com/office/powerpoint/2012/main">
+        <p15:guide id="1" orient="horz" pos="872">
+          <p15:clr>
+            <a:srgbClr val="A4A3A4"/>
+          </p15:clr>
+        </p15:guide>
+        <p15:guide id="2" pos="895">
+          <p15:clr>
+            <a:srgbClr val="A4A3A4"/>
+          </p15:clr>
+        </p15:guide>
+      </p15:sldGuideLst>
+    </p:ext>
+  </p:extLst>
 </p:presentation>
 </file>
 
@@ -150,7 +166,7 @@
           </a:lstStyle>
           <a:p>
             <a:r>
-              <a:rPr lang="de-DE" smtClean="0"/>
+              <a:rPr lang="de-DE"/>
               <a:t>Mastertitelformat bearbeiten</a:t>
             </a:r>
             <a:endParaRPr lang="de-DE" dirty="0"/>
@@ -271,7 +287,7 @@
           </a:lstStyle>
           <a:p>
             <a:r>
-              <a:rPr lang="de-DE" smtClean="0"/>
+              <a:rPr lang="de-DE"/>
               <a:t>Master-Untertitelformat bearbeiten</a:t>
             </a:r>
             <a:endParaRPr lang="de-DE" dirty="0"/>
@@ -305,128 +321,38 @@
           <a:p>
             <a:pPr lvl="0"/>
             <a:r>
-              <a:rPr lang="de-DE" smtClean="0"/>
+              <a:rPr lang="de-DE"/>
               <a:t>Mastertextformat bearbeiten</a:t>
             </a:r>
           </a:p>
           <a:p>
             <a:pPr lvl="1"/>
             <a:r>
-              <a:rPr lang="de-DE" smtClean="0"/>
+              <a:rPr lang="de-DE"/>
               <a:t>Zweite Ebene</a:t>
             </a:r>
           </a:p>
           <a:p>
             <a:pPr lvl="2"/>
             <a:r>
-              <a:rPr lang="de-DE" smtClean="0"/>
+              <a:rPr lang="de-DE"/>
               <a:t>Dritte Ebene</a:t>
             </a:r>
           </a:p>
           <a:p>
             <a:pPr lvl="3"/>
             <a:r>
-              <a:rPr lang="de-DE" smtClean="0"/>
+              <a:rPr lang="de-DE"/>
               <a:t>Vierte Ebene</a:t>
             </a:r>
           </a:p>
           <a:p>
             <a:pPr lvl="4"/>
             <a:r>
-              <a:rPr lang="de-DE" smtClean="0"/>
+              <a:rPr lang="de-DE"/>
               <a:t>Fünfte Ebene</a:t>
             </a:r>
             <a:endParaRPr lang="de-DE" dirty="0"/>
-          </a:p>
-        </p:txBody>
-      </p:sp>
-      <p:sp>
-        <p:nvSpPr>
-          <p:cNvPr id="5" name="Titelplatzhalter 1"/>
-          <p:cNvSpPr txBox="1">
-            <a:spLocks/>
-          </p:cNvSpPr>
-          <p:nvPr userDrawn="1"/>
-        </p:nvSpPr>
-        <p:spPr>
-          <a:xfrm>
-            <a:off x="1169473" y="1134130"/>
-            <a:ext cx="4855779" cy="246221"/>
-          </a:xfrm>
-          <a:prstGeom prst="rect">
-            <a:avLst/>
-          </a:prstGeom>
-          <a:noFill/>
-        </p:spPr>
-        <p:txBody>
-          <a:bodyPr wrap="square" rtlCol="0">
-            <a:spAutoFit/>
-          </a:bodyPr>
-          <a:lstStyle>
-            <a:lvl1pPr algn="ctr" defTabSz="403388" rtl="0" eaLnBrk="1" latinLnBrk="0" hangingPunct="1">
-              <a:spcBef>
-                <a:spcPct val="0"/>
-              </a:spcBef>
-              <a:buNone/>
-              <a:defRPr lang="de-DE" sz="2400" b="0" kern="1200" baseline="0">
-                <a:solidFill>
-                  <a:srgbClr val="7E006B"/>
-                </a:solidFill>
-                <a:latin typeface="Avenir Heavy"/>
-                <a:ea typeface="+mn-ea"/>
-                <a:cs typeface="Avenir Heavy"/>
-              </a:defRPr>
-            </a:lvl1pPr>
-          </a:lstStyle>
-          <a:p>
-            <a:pPr algn="l"/>
-            <a:r>
-              <a:rPr lang="de-DE" sz="1000" dirty="0" smtClean="0">
-                <a:solidFill>
-                  <a:srgbClr val="5D5E5F"/>
-                </a:solidFill>
-                <a:latin typeface="Avenir Book"/>
-                <a:cs typeface="Avenir Book"/>
-              </a:rPr>
-              <a:t>REGINA</a:t>
-            </a:r>
-            <a:r>
-              <a:rPr lang="de-DE" sz="1000" baseline="0" dirty="0" smtClean="0">
-                <a:solidFill>
-                  <a:srgbClr val="5D5E5F"/>
-                </a:solidFill>
-                <a:latin typeface="Avenir Book"/>
-                <a:cs typeface="Avenir Book"/>
-              </a:rPr>
-              <a:t> </a:t>
-            </a:r>
-            <a:r>
-              <a:rPr lang="de-DE" sz="1000" baseline="0" dirty="0" smtClean="0">
-                <a:solidFill>
-                  <a:srgbClr val="5D5E5F"/>
-                </a:solidFill>
-                <a:latin typeface="Avenir Book"/>
-                <a:cs typeface="Avenir Book"/>
-              </a:rPr>
-              <a:t>BRANDHUBER, zuletzt geändert am 25. Oktober 2015</a:t>
-            </a:r>
-            <a:r>
-              <a:rPr lang="de-DE" sz="1000" dirty="0" smtClean="0">
-                <a:solidFill>
-                  <a:srgbClr val="5D5E5F"/>
-                </a:solidFill>
-                <a:latin typeface="Avenir Book"/>
-                <a:cs typeface="Avenir Book"/>
-              </a:rPr>
-              <a:t> </a:t>
-            </a:r>
-            <a:endParaRPr lang="de-DE" sz="1000" dirty="0">
-              <a:solidFill>
-                <a:srgbClr val="5D5E5F"/>
-              </a:solidFill>
-              <a:latin typeface="Avenir Book"/>
-              <a:cs typeface="Avenir Book"/>
-            </a:endParaRPr>
           </a:p>
         </p:txBody>
       </p:sp>
@@ -539,35 +465,35 @@
           <a:p>
             <a:pPr lvl="0"/>
             <a:r>
-              <a:rPr lang="de-DE" smtClean="0"/>
+              <a:rPr lang="de-DE"/>
               <a:t>Mastertextformat bearbeiten</a:t>
             </a:r>
           </a:p>
           <a:p>
             <a:pPr lvl="1"/>
             <a:r>
-              <a:rPr lang="de-DE" smtClean="0"/>
+              <a:rPr lang="de-DE"/>
               <a:t>Zweite Ebene</a:t>
             </a:r>
           </a:p>
           <a:p>
             <a:pPr lvl="2"/>
             <a:r>
-              <a:rPr lang="de-DE" smtClean="0"/>
+              <a:rPr lang="de-DE"/>
               <a:t>Dritte Ebene</a:t>
             </a:r>
           </a:p>
           <a:p>
             <a:pPr lvl="3"/>
             <a:r>
-              <a:rPr lang="de-DE" smtClean="0"/>
+              <a:rPr lang="de-DE"/>
               <a:t>Vierte Ebene</a:t>
             </a:r>
           </a:p>
           <a:p>
             <a:pPr lvl="4"/>
             <a:r>
-              <a:rPr lang="de-DE" smtClean="0"/>
+              <a:rPr lang="de-DE"/>
               <a:t>Fünfte Ebene</a:t>
             </a:r>
             <a:endParaRPr lang="de-DE" dirty="0"/>
@@ -597,7 +523,7 @@
           <a:lstStyle/>
           <a:p>
             <a:r>
-              <a:rPr lang="de-DE" sz="2400" dirty="0" smtClean="0">
+              <a:rPr lang="de-DE" sz="2400" dirty="0">
                 <a:solidFill>
                   <a:srgbClr val="7E006B"/>
                 </a:solidFill>
@@ -607,7 +533,7 @@
               <a:t>TR	AININGS</a:t>
             </a:r>
             <a:r>
-              <a:rPr lang="de-DE" sz="2400" dirty="0" smtClean="0">
+              <a:rPr lang="de-DE" sz="2400" dirty="0">
                 <a:solidFill>
                   <a:srgbClr val="7E006B"/>
                 </a:solidFill>
@@ -672,10 +598,9 @@
           <a:lstStyle/>
           <a:p>
             <a:r>
-              <a:rPr lang="de-DE" smtClean="0"/>
+              <a:rPr lang="de-DE"/>
               <a:t>Mastertitelformat bearbeiten</a:t>
             </a:r>
-            <a:endParaRPr lang="de-DE"/>
           </a:p>
         </p:txBody>
       </p:sp>
@@ -696,7 +621,7 @@
           <a:p>
             <a:fld id="{FF5B2BAF-DF38-0A48-A798-0C06E514FD52}" type="datetimeFigureOut">
               <a:rPr lang="de-DE" smtClean="0"/>
-              <a:t>25.10.15</a:t>
+              <a:t>29.07.23</a:t>
             </a:fld>
             <a:endParaRPr lang="de-DE" dirty="0"/>
           </a:p>
@@ -807,10 +732,9 @@
           <a:p>
             <a:pPr marL="0" lvl="0" algn="l"/>
             <a:r>
-              <a:rPr lang="de-DE" dirty="0" smtClean="0"/>
+              <a:rPr lang="de-DE" dirty="0"/>
               <a:t>Überschrift bearbeiten </a:t>
             </a:r>
-            <a:endParaRPr lang="de-DE" dirty="0"/>
           </a:p>
         </p:txBody>
       </p:sp>
@@ -841,38 +765,37 @@
           <a:p>
             <a:pPr lvl="0"/>
             <a:r>
-              <a:rPr lang="de-DE" dirty="0" smtClean="0"/>
+              <a:rPr lang="de-DE" dirty="0"/>
               <a:t>Mastertextformat bearbeiten</a:t>
             </a:r>
           </a:p>
           <a:p>
             <a:pPr lvl="1"/>
             <a:r>
-              <a:rPr lang="de-DE" dirty="0" smtClean="0"/>
+              <a:rPr lang="de-DE" dirty="0"/>
               <a:t>Zweite Ebene</a:t>
             </a:r>
           </a:p>
           <a:p>
             <a:pPr lvl="2"/>
             <a:r>
-              <a:rPr lang="de-DE" dirty="0" smtClean="0"/>
+              <a:rPr lang="de-DE" dirty="0"/>
               <a:t>Dritte Ebene</a:t>
             </a:r>
           </a:p>
           <a:p>
             <a:pPr lvl="3"/>
             <a:r>
-              <a:rPr lang="de-DE" dirty="0" smtClean="0"/>
+              <a:rPr lang="de-DE" dirty="0"/>
               <a:t>Vierte Ebene</a:t>
             </a:r>
           </a:p>
           <a:p>
             <a:pPr lvl="4"/>
             <a:r>
-              <a:rPr lang="de-DE" dirty="0" smtClean="0"/>
+              <a:rPr lang="de-DE" dirty="0"/>
               <a:t>Fünfte Ebene</a:t>
             </a:r>
-            <a:endParaRPr lang="de-DE" dirty="0"/>
           </a:p>
         </p:txBody>
       </p:sp>
@@ -911,7 +834,7 @@
           <a:p>
             <a:fld id="{FF5B2BAF-DF38-0A48-A798-0C06E514FD52}" type="datetimeFigureOut">
               <a:rPr lang="de-DE" smtClean="0"/>
-              <a:t>25.10.15</a:t>
+              <a:t>29.07.23</a:t>
             </a:fld>
             <a:endParaRPr lang="de-DE" dirty="0"/>
           </a:p>
@@ -1145,7 +1068,7 @@
           <a:lstStyle/>
           <a:p>
             <a:r>
-              <a:rPr lang="de-DE" sz="1050" b="1" dirty="0" smtClean="0">
+              <a:rPr lang="de-DE" sz="1050" b="1" dirty="0">
                 <a:solidFill>
                   <a:schemeClr val="bg1"/>
                 </a:solidFill>
@@ -1155,7 +1078,7 @@
               <a:t>TRAININGSKARTE</a:t>
             </a:r>
             <a:r>
-              <a:rPr lang="de-DE" sz="1050" dirty="0" smtClean="0">
+              <a:rPr lang="de-DE" sz="1050" dirty="0">
                 <a:solidFill>
                   <a:schemeClr val="bg1"/>
                 </a:solidFill>
@@ -1165,7 +1088,7 @@
               <a:t> </a:t>
             </a:r>
             <a:r>
-              <a:rPr lang="de-DE" sz="1050" b="1" dirty="0" smtClean="0">
+              <a:rPr lang="de-DE" sz="1050" b="1" dirty="0">
                 <a:solidFill>
                   <a:schemeClr val="bg1"/>
                 </a:solidFill>
@@ -1174,13 +1097,6 @@
               </a:rPr>
               <a:t>TOM 18</a:t>
             </a:r>
-            <a:endParaRPr lang="de-DE" sz="1050" b="1" dirty="0">
-              <a:solidFill>
-                <a:schemeClr val="bg1"/>
-              </a:solidFill>
-              <a:latin typeface="Avenir Heavy"/>
-              <a:cs typeface="Avenir Heavy"/>
-            </a:endParaRPr>
           </a:p>
         </p:txBody>
       </p:sp>
@@ -1563,20 +1479,16 @@
           <a:lstStyle/>
           <a:p>
             <a:r>
-              <a:rPr lang="de-DE" dirty="0" smtClean="0"/>
+              <a:rPr lang="de-DE" dirty="0"/>
               <a:t>AUFDREHEN</a:t>
             </a:r>
             <a:r>
-              <a:rPr lang="de-DE" dirty="0" smtClean="0">
+              <a:rPr lang="de-DE" dirty="0">
                 <a:latin typeface="Avenir Book"/>
                 <a:cs typeface="Avenir Book"/>
               </a:rPr>
               <a:t>-FERTIG-LOS</a:t>
             </a:r>
-            <a:endParaRPr lang="de-DE" dirty="0">
-              <a:latin typeface="Avenir Book"/>
-              <a:cs typeface="Avenir Book"/>
-            </a:endParaRPr>
           </a:p>
         </p:txBody>
       </p:sp>
@@ -1775,7 +1687,7 @@
               </a:lnSpc>
             </a:pPr>
             <a:r>
-              <a:rPr lang="de-DE" sz="1200" dirty="0" smtClean="0"/>
+              <a:rPr lang="de-DE" sz="1200" dirty="0"/>
               <a:t>Bevor Du diese Karte trainierst solltest Du für TOM 08 zertifiziert sein. Diese Karte baut auf ihr auf.</a:t>
             </a:r>
           </a:p>
@@ -1786,31 +1698,31 @@
               </a:lnSpc>
             </a:pPr>
             <a:r>
-              <a:rPr lang="de-DE" sz="1200" dirty="0" smtClean="0"/>
+              <a:rPr lang="de-DE" sz="1200" dirty="0"/>
               <a:t>Die </a:t>
             </a:r>
             <a:r>
-              <a:rPr lang="de-DE" sz="1200" dirty="0" err="1" smtClean="0"/>
+              <a:rPr lang="de-DE" sz="1200" dirty="0" err="1"/>
               <a:t>Pomodoro</a:t>
             </a:r>
             <a:r>
-              <a:rPr lang="de-DE" sz="1200" dirty="0" smtClean="0"/>
+              <a:rPr lang="de-DE" sz="1200" dirty="0"/>
               <a:t> Technique®</a:t>
             </a:r>
             <a:r>
-              <a:rPr lang="de-DE" sz="1200" baseline="30000" dirty="0" smtClean="0"/>
+              <a:rPr lang="de-DE" sz="1200" baseline="30000" dirty="0"/>
               <a:t>1</a:t>
             </a:r>
             <a:r>
-              <a:rPr lang="de-DE" sz="1200" dirty="0" smtClean="0"/>
+              <a:rPr lang="de-DE" sz="1200" dirty="0"/>
               <a:t>  ist ein Zeitmanagementwerkzeug, das von Francesco </a:t>
             </a:r>
             <a:r>
-              <a:rPr lang="de-DE" sz="1200" dirty="0" err="1" smtClean="0"/>
+              <a:rPr lang="de-DE" sz="1200" dirty="0" err="1"/>
               <a:t>Cirillo</a:t>
             </a:r>
             <a:r>
-              <a:rPr lang="de-DE" sz="1200" dirty="0" smtClean="0"/>
+              <a:rPr lang="de-DE" sz="1200" dirty="0"/>
               <a:t> erfunden wurde. Es kann Dir dabei helfen, konzentrierter und zielgerichteter zu arbeiten.</a:t>
             </a:r>
           </a:p>
@@ -1821,15 +1733,15 @@
               </a:lnSpc>
             </a:pPr>
             <a:r>
-              <a:rPr lang="de-DE" sz="1200" dirty="0" smtClean="0"/>
+              <a:rPr lang="de-DE" sz="1200" dirty="0"/>
               <a:t>Du arbeitest in exakten Zeitfenstern: z.B. 25 Minuten mit 5 Minuten Pause. </a:t>
             </a:r>
             <a:r>
-              <a:rPr lang="de-DE" sz="1200" dirty="0" err="1" smtClean="0"/>
+              <a:rPr lang="de-DE" sz="1200" dirty="0" err="1"/>
               <a:t>Cirillio</a:t>
             </a:r>
             <a:r>
-              <a:rPr lang="de-DE" sz="1200" dirty="0" smtClean="0"/>
+              <a:rPr lang="de-DE" sz="1200" dirty="0"/>
               <a:t> nennt diese Zeitspanne "Tomate", nach den gängigen Eieruhren in Tomatenform.</a:t>
             </a:r>
           </a:p>
@@ -1840,15 +1752,15 @@
               </a:lnSpc>
             </a:pPr>
             <a:r>
-              <a:rPr lang="de-DE" sz="1200" dirty="0" smtClean="0"/>
+              <a:rPr lang="de-DE" sz="1200" dirty="0"/>
               <a:t>Die Zeit wird mit einem </a:t>
             </a:r>
             <a:r>
-              <a:rPr lang="de-DE" sz="1200" dirty="0" err="1" smtClean="0"/>
+              <a:rPr lang="de-DE" sz="1200" dirty="0" err="1"/>
               <a:t>Timer</a:t>
             </a:r>
             <a:r>
-              <a:rPr lang="de-DE" sz="1200" dirty="0" smtClean="0"/>
+              <a:rPr lang="de-DE" sz="1200" dirty="0"/>
               <a:t> heruntergezählt und sollte nach Möglichkeit nicht unterbrochen werden.</a:t>
             </a:r>
           </a:p>
@@ -1859,7 +1771,7 @@
               </a:lnSpc>
             </a:pPr>
             <a:r>
-              <a:rPr lang="de-DE" sz="1200" dirty="0" smtClean="0"/>
+              <a:rPr lang="de-DE" sz="1200" dirty="0"/>
               <a:t>Zeit, die Du in Tomaten einteilst, nimmst Du möglicherweise anders wahr. </a:t>
             </a:r>
           </a:p>
@@ -1870,7 +1782,7 @@
               </a:lnSpc>
             </a:pPr>
             <a:r>
-              <a:rPr lang="de-DE" sz="1200" dirty="0" smtClean="0"/>
+              <a:rPr lang="de-DE" sz="1200" dirty="0"/>
               <a:t>Fokussiere jede Tomate auf ein bestimmtes Thema.</a:t>
             </a:r>
           </a:p>
@@ -1881,7 +1793,7 @@
               </a:lnSpc>
             </a:pPr>
             <a:r>
-              <a:rPr lang="de-DE" sz="1200" dirty="0" smtClean="0"/>
+              <a:rPr lang="de-DE" sz="1200" dirty="0"/>
               <a:t>Das Ziel der Tomate bestimmst Du vorher und nach Ablauf reflektierst Du das Ergebnis und Deine Zufriedenheit.</a:t>
             </a:r>
           </a:p>
@@ -1892,7 +1804,7 @@
               </a:lnSpc>
             </a:pPr>
             <a:r>
-              <a:rPr lang="de-DE" sz="1200" dirty="0" smtClean="0"/>
+              <a:rPr lang="de-DE" sz="1200" dirty="0"/>
               <a:t>Die Pausen zwischen den Tomaten helfen Dir die Konzentration und Motivation über eine längere Zeitspanne aufrecht zu erhalten.</a:t>
             </a:r>
             <a:endParaRPr lang="de-DE" dirty="0"/>
@@ -2015,7 +1927,7 @@
           </a:lstStyle>
           <a:p>
             <a:r>
-              <a:rPr lang="de-DE" sz="900" baseline="30000" dirty="0" smtClean="0">
+              <a:rPr lang="de-DE" sz="900" baseline="30000" dirty="0">
                 <a:solidFill>
                   <a:schemeClr val="bg1">
                     <a:lumMod val="65000"/>
@@ -2025,7 +1937,7 @@
               <a:t>1</a:t>
             </a:r>
             <a:r>
-              <a:rPr lang="de-DE" sz="900" dirty="0" smtClean="0">
+              <a:rPr lang="de-DE" sz="900" dirty="0">
                 <a:solidFill>
                   <a:schemeClr val="bg1">
                     <a:lumMod val="65000"/>
@@ -2035,7 +1947,7 @@
               <a:t>  </a:t>
             </a:r>
             <a:r>
-              <a:rPr lang="de-DE" sz="900" dirty="0" err="1" smtClean="0">
+              <a:rPr lang="de-DE" sz="900" dirty="0" err="1">
                 <a:solidFill>
                   <a:schemeClr val="bg1">
                     <a:lumMod val="65000"/>
@@ -2110,38 +2022,9 @@
               </a:spcBef>
             </a:pPr>
             <a:r>
-              <a:rPr lang="de-DE" sz="1200" dirty="0" smtClean="0"/>
-              <a:t>Das </a:t>
-            </a:r>
-            <a:r>
               <a:rPr lang="de-DE" sz="1200" dirty="0"/>
-              <a:t>Ziel ist, möglichst genau einschätzen zu können, was Du in </a:t>
-            </a:r>
-            <a:r>
-              <a:rPr lang="de-DE" sz="1200" dirty="0" smtClean="0"/>
-              <a:t>einer </a:t>
-            </a:r>
-            <a:r>
-              <a:rPr lang="de-DE" sz="1200" dirty="0"/>
-              <a:t>Tomate schaffst. Auch wenn Du mehr geschafft hast, als vorhergesagt</a:t>
-            </a:r>
-            <a:r>
-              <a:rPr lang="de-DE" sz="1200" dirty="0" smtClean="0"/>
-              <a:t>, ist </a:t>
-            </a:r>
-            <a:r>
-              <a:rPr lang="de-DE" sz="1200" dirty="0"/>
-              <a:t>das eine Abweichung von Deinen Vorhersagen, genau wie wenn </a:t>
-            </a:r>
-            <a:r>
-              <a:rPr lang="de-DE" sz="1200" dirty="0" smtClean="0"/>
-              <a:t>Du Dir </a:t>
-            </a:r>
-            <a:r>
-              <a:rPr lang="de-DE" sz="1200" dirty="0"/>
-              <a:t>zu viel vorgenommen hast. </a:t>
-            </a:r>
-            <a:endParaRPr lang="de-DE" sz="1200" dirty="0" smtClean="0"/>
+              <a:t>Das Ziel ist, möglichst genau einschätzen zu können, was Du in einer Tomate schaffst. Auch wenn Du mehr geschafft hast, als vorhergesagt, ist das eine Abweichung von Deinen Vorhersagen, genau wie wenn Du Dir zu viel vorgenommen hast. </a:t>
+            </a:r>
           </a:p>
           <a:p>
             <a:pPr marL="263525" lvl="1" indent="-263525">
@@ -2154,13 +2037,8 @@
             </a:pPr>
             <a:r>
               <a:rPr lang="de-DE" sz="1200" dirty="0"/>
-              <a:t>Trainiere die Varianten nacheinander und nicht zeitgleich</a:t>
-            </a:r>
-            <a:r>
-              <a:rPr lang="de-DE" sz="1200" dirty="0" smtClean="0"/>
-              <a:t>.</a:t>
-            </a:r>
-            <a:endParaRPr lang="de-DE" sz="1200" dirty="0"/>
+              <a:t>Trainiere die Varianten nacheinander und nicht zeitgleich.</a:t>
+            </a:r>
           </a:p>
           <a:p>
             <a:pPr>
@@ -2186,34 +2064,9 @@
               </a:spcBef>
             </a:pPr>
             <a:r>
-              <a:rPr lang="de-DE" sz="1200" dirty="0" smtClean="0"/>
-              <a:t>Mache innerhalb </a:t>
-            </a:r>
-            <a:r>
               <a:rPr lang="de-DE" sz="1200" dirty="0"/>
-              <a:t>von 2 Wochen</a:t>
-            </a:r>
-            <a:r>
-              <a:rPr lang="de-DE" sz="1200" dirty="0" smtClean="0"/>
-              <a:t> </a:t>
-            </a:r>
-            <a:r>
-              <a:rPr lang="de-DE" sz="1200" dirty="0"/>
-              <a:t>15 Tomaten an mindestens 8</a:t>
-            </a:r>
-            <a:r>
-              <a:rPr lang="de-DE" sz="1200" dirty="0" smtClean="0"/>
-              <a:t> </a:t>
-            </a:r>
-            <a:r>
-              <a:rPr lang="de-DE" sz="1200" dirty="0"/>
-              <a:t>verschiedenen </a:t>
-            </a:r>
-            <a:r>
-              <a:rPr lang="de-DE" sz="1200" dirty="0" smtClean="0"/>
-              <a:t>Tagen.</a:t>
-            </a:r>
-            <a:endParaRPr lang="de-DE" sz="1200" dirty="0"/>
+              <a:t>Mache innerhalb von 2 Wochen 15 Tomaten an mindestens 8 verschiedenen Tagen.</a:t>
+            </a:r>
           </a:p>
           <a:p>
             <a:pPr lvl="1">
@@ -2225,16 +2078,8 @@
               </a:spcBef>
             </a:pPr>
             <a:r>
-              <a:rPr lang="de-DE" sz="1200" dirty="0" smtClean="0"/>
-              <a:t>Dokumentiere </a:t>
-            </a:r>
-            <a:r>
               <a:rPr lang="de-DE" sz="1200" dirty="0"/>
-              <a:t>vor der Tomate nicht nur das Ziel, sondern auch </a:t>
-            </a:r>
-            <a:r>
-              <a:rPr lang="de-DE" sz="1200" dirty="0" smtClean="0"/>
-              <a:t>jeden kleinen Schritt, den Du brauchst um Dein Ziel zu erreichen. </a:t>
+              <a:t>Dokumentiere vor der Tomate nicht nur das Ziel, sondern auch jeden kleinen Schritt, den Du brauchst um Dein Ziel zu erreichen. </a:t>
             </a:r>
           </a:p>
           <a:p>
@@ -2247,12 +2092,8 @@
               </a:spcBef>
             </a:pPr>
             <a:r>
-              <a:rPr lang="de-DE" sz="1200" dirty="0" smtClean="0"/>
-              <a:t>Variante </a:t>
-            </a:r>
-            <a:r>
               <a:rPr lang="de-DE" sz="1200" dirty="0"/>
-              <a:t>2: </a:t>
+              <a:t>Variante 2: </a:t>
             </a:r>
           </a:p>
           <a:p>
@@ -2272,12 +2113,8 @@
               <a:rPr lang="de-DE" sz="1200" dirty="0"/>
             </a:br>
             <a:r>
-              <a:rPr lang="de-DE" sz="1200" dirty="0" smtClean="0"/>
-              <a:t>8 </a:t>
-            </a:r>
-            <a:r>
               <a:rPr lang="de-DE" sz="1200" dirty="0"/>
-              <a:t>verschiedenen Tagen.</a:t>
+              <a:t>8 verschiedenen Tagen.</a:t>
             </a:r>
           </a:p>
           <a:p>
@@ -2290,54 +2127,26 @@
               </a:spcBef>
             </a:pPr>
             <a:r>
-              <a:rPr lang="de-DE" sz="1200" dirty="0" err="1" smtClean="0"/>
+              <a:rPr lang="de-DE" sz="1200" dirty="0" err="1"/>
               <a:t>Wieviel</a:t>
             </a:r>
             <a:r>
-              <a:rPr lang="de-DE" sz="1200" dirty="0" smtClean="0"/>
-              <a:t> </a:t>
-            </a:r>
-            <a:r>
               <a:rPr lang="de-DE" sz="1200" dirty="0"/>
-              <a:t>Prozent von dem, was Du Dir vorgenommen hast, </a:t>
-            </a:r>
-            <a:r>
-              <a:rPr lang="de-DE" sz="1200" dirty="0" smtClean="0"/>
-              <a:t/>
+              <a:t> Prozent von dem, was Du Dir vorgenommen hast, </a:t>
             </a:r>
             <a:br>
-              <a:rPr lang="de-DE" sz="1200" dirty="0" smtClean="0"/>
+              <a:rPr lang="de-DE" sz="1200" dirty="0"/>
             </a:br>
             <a:r>
-              <a:rPr lang="de-DE" sz="1200" dirty="0" smtClean="0"/>
-              <a:t>hast </a:t>
-            </a:r>
-            <a:r>
               <a:rPr lang="de-DE" sz="1200" dirty="0"/>
-              <a:t>Du erreicht? </a:t>
-            </a:r>
-            <a:r>
-              <a:rPr lang="de-DE" sz="1200" dirty="0" smtClean="0"/>
-              <a:t>Ergänze </a:t>
-            </a:r>
-            <a:r>
+              <a:t>hast Du erreicht? Ergänze Deine Tomaten-Dokumentation </a:t>
+            </a:r>
+            <a:br>
               <a:rPr lang="de-DE" sz="1200" dirty="0"/>
-              <a:t>Deine Tomaten-Dokumentation </a:t>
-            </a:r>
-            <a:r>
-              <a:rPr lang="de-DE" sz="1200" dirty="0" smtClean="0"/>
-              <a:t/>
-            </a:r>
-            <a:br>
-              <a:rPr lang="de-DE" sz="1200" dirty="0" smtClean="0"/>
             </a:br>
             <a:r>
-              <a:rPr lang="de-DE" sz="1200" dirty="0" smtClean="0"/>
-              <a:t>um </a:t>
-            </a:r>
-            <a:r>
               <a:rPr lang="de-DE" sz="1200" dirty="0"/>
-              <a:t>diese Prozentangabe.</a:t>
+              <a:t>um diese Prozentangabe.</a:t>
             </a:r>
             <a:br>
               <a:rPr lang="de-DE" sz="1200" dirty="0"/>
@@ -2348,14 +2157,20 @@
       </p:sp>
       <p:sp>
         <p:nvSpPr>
-          <p:cNvPr id="3" name="Shape 7"/>
+          <p:cNvPr id="5" name="Shape 7">
+            <a:extLst>
+              <a:ext uri="{FF2B5EF4-FFF2-40B4-BE49-F238E27FC236}">
+                <a16:creationId xmlns:a16="http://schemas.microsoft.com/office/drawing/2014/main" id="{5C960C31-09B5-C622-371A-C7EDEA457F99}"/>
+              </a:ext>
+            </a:extLst>
+          </p:cNvPr>
           <p:cNvSpPr/>
           <p:nvPr/>
         </p:nvSpPr>
         <p:spPr>
           <a:xfrm>
-            <a:off x="1790352" y="4952581"/>
-            <a:ext cx="3823764" cy="294639"/>
+            <a:off x="971550" y="4689585"/>
+            <a:ext cx="4691860" cy="461661"/>
           </a:xfrm>
           <a:prstGeom prst="rect">
             <a:avLst/>
@@ -2365,12 +2180,12 @@
           </a:ln>
           <a:extLst>
             <a:ext uri="{C572A759-6A51-4108-AA02-DFA0A04FC94B}">
-              <ma14:wrappingTextBoxFlag xmlns:ma14="http://schemas.microsoft.com/office/mac/drawingml/2011/main" val="1"/>
+              <ma14:wrappingTextBoxFlag xmlns:ma14="http://schemas.microsoft.com/office/mac/drawingml/2011/main" xmlns="" val="1"/>
             </a:ext>
           </a:extLst>
         </p:spPr>
         <p:txBody>
-          <a:bodyPr wrap="none" lIns="45718" tIns="45718" rIns="45718" bIns="45718">
+          <a:bodyPr wrap="square" lIns="45718" tIns="45718" rIns="45718" bIns="45718">
             <a:spAutoFit/>
           </a:bodyPr>
           <a:lstStyle/>
@@ -2379,13 +2194,56 @@
               <a:defRPr sz="1800"/>
             </a:pPr>
             <a:r>
-              <a:rPr sz="600" dirty="0">
-                <a:latin typeface="Calibri"/>
-                <a:ea typeface="Calibri"/>
-                <a:cs typeface="Calibri"/>
-                <a:sym typeface="Calibri"/>
+              <a:rPr lang="de-DE" sz="800" b="0" i="0" u="none" strike="noStrike" dirty="0" err="1">
+                <a:solidFill>
+                  <a:schemeClr val="tx1">
+                    <a:lumMod val="65000"/>
+                    <a:lumOff val="35000"/>
+                  </a:schemeClr>
+                </a:solidFill>
+                <a:effectLst/>
+                <a:latin typeface="Avenir Book" panose="02000503020000020003" pitchFamily="2" charset="0"/>
               </a:rPr>
-              <a:t>This work is licensed under the Creative Commons Attribution-NonCommercial-NoDerivatives 4.0 International License. </a:t>
+              <a:t>music</a:t>
+            </a:r>
+            <a:r>
+              <a:rPr lang="de-DE" sz="800" b="0" i="0" u="none" strike="noStrike" dirty="0">
+                <a:solidFill>
+                  <a:schemeClr val="tx1">
+                    <a:lumMod val="65000"/>
+                    <a:lumOff val="35000"/>
+                  </a:schemeClr>
+                </a:solidFill>
+                <a:effectLst/>
+                <a:latin typeface="Avenir Book" panose="02000503020000020003" pitchFamily="2" charset="0"/>
+              </a:rPr>
+              <a:t> </a:t>
+            </a:r>
+            <a:r>
+              <a:rPr lang="de-DE" sz="800" b="0" i="0" u="none" strike="noStrike" dirty="0" err="1">
+                <a:solidFill>
+                  <a:schemeClr val="tx1">
+                    <a:lumMod val="65000"/>
+                    <a:lumOff val="35000"/>
+                  </a:schemeClr>
+                </a:solidFill>
+                <a:effectLst/>
+                <a:latin typeface="Avenir Book" panose="02000503020000020003" pitchFamily="2" charset="0"/>
+              </a:rPr>
+              <a:t>moves</a:t>
+            </a:r>
+            <a:r>
+              <a:rPr lang="de-DE" sz="800" b="0" i="0" u="none" strike="noStrike" dirty="0">
+                <a:solidFill>
+                  <a:schemeClr val="tx1">
+                    <a:lumMod val="65000"/>
+                    <a:lumOff val="35000"/>
+                  </a:schemeClr>
+                </a:solidFill>
+                <a:effectLst/>
+                <a:latin typeface="Avenir Book" panose="02000503020000020003" pitchFamily="2" charset="0"/>
+              </a:rPr>
+              <a:t>-Trainingskarten von Regina Brandhuber sind lizenziert unter einer Creative Commons </a:t>
             </a:r>
           </a:p>
           <a:p>
@@ -2393,54 +2251,209 @@
               <a:defRPr sz="1800"/>
             </a:pPr>
             <a:r>
-              <a:rPr sz="600" dirty="0">
-                <a:latin typeface="Calibri"/>
+              <a:rPr lang="de-DE" sz="800" b="0" i="0" u="none" strike="noStrike" dirty="0">
+                <a:solidFill>
+                  <a:schemeClr val="tx1">
+                    <a:lumMod val="65000"/>
+                    <a:lumOff val="35000"/>
+                  </a:schemeClr>
+                </a:solidFill>
+                <a:effectLst/>
+                <a:latin typeface="Avenir Book" panose="02000503020000020003" pitchFamily="2" charset="0"/>
+              </a:rPr>
+              <a:t>Namensnennung-Nicht kommerziell 4.0 International Lizenz.</a:t>
+            </a:r>
+          </a:p>
+          <a:p>
+            <a:pPr lvl="0" algn="ctr">
+              <a:defRPr sz="1800"/>
+            </a:pPr>
+            <a:r>
+              <a:rPr lang="de-DE" sz="800" dirty="0">
+                <a:solidFill>
+                  <a:schemeClr val="tx1">
+                    <a:lumMod val="65000"/>
+                    <a:lumOff val="35000"/>
+                  </a:schemeClr>
+                </a:solidFill>
+                <a:latin typeface="Avenir Book" panose="02000503020000020003" pitchFamily="2" charset="0"/>
                 <a:ea typeface="Calibri"/>
-                <a:cs typeface="Calibri"/>
+                <a:cs typeface="Avenir Light"/>
                 <a:sym typeface="Calibri"/>
               </a:rPr>
-              <a:t>To view a copy of this license, visit </a:t>
-            </a:r>
-            <a:r>
-              <a:rPr sz="600" dirty="0">
-                <a:latin typeface="Calibri"/>
+              <a:t>Nachzulesen unter:</a:t>
+            </a:r>
+            <a:r>
+              <a:rPr sz="800" dirty="0">
+                <a:solidFill>
+                  <a:schemeClr val="tx1">
+                    <a:lumMod val="65000"/>
+                    <a:lumOff val="35000"/>
+                  </a:schemeClr>
+                </a:solidFill>
+                <a:latin typeface="Avenir Book" panose="02000503020000020003" pitchFamily="2" charset="0"/>
                 <a:ea typeface="Calibri"/>
-                <a:cs typeface="Calibri"/>
-                <a:sym typeface="Calibri"/>
-                <a:hlinkClick r:id="rId2"/>
-              </a:rPr>
-              <a:t>http://creativecommons.org/licenses/by-nc-nd/4.0/</a:t>
-            </a:r>
-            <a:r>
-              <a:rPr sz="600" dirty="0">
-                <a:latin typeface="Calibri"/>
-                <a:ea typeface="Calibri"/>
-                <a:cs typeface="Calibri"/>
+                <a:cs typeface="Avenir Light"/>
                 <a:sym typeface="Calibri"/>
               </a:rPr>
-              <a:t>.</a:t>
-            </a:r>
+              <a:t> </a:t>
+            </a:r>
+            <a:r>
+              <a:rPr lang="de-DE" sz="800" dirty="0">
+                <a:solidFill>
+                  <a:schemeClr val="tx1">
+                    <a:lumMod val="65000"/>
+                    <a:lumOff val="35000"/>
+                  </a:schemeClr>
+                </a:solidFill>
+                <a:latin typeface="Avenir Book" panose="02000503020000020003" pitchFamily="2" charset="0"/>
+                <a:ea typeface="Calibri"/>
+                <a:cs typeface="Avenir Light"/>
+                <a:sym typeface="Calibri"/>
+              </a:rPr>
+              <a:t>https://</a:t>
+            </a:r>
+            <a:r>
+              <a:rPr lang="de-DE" sz="800" dirty="0" err="1">
+                <a:solidFill>
+                  <a:schemeClr val="tx1">
+                    <a:lumMod val="65000"/>
+                    <a:lumOff val="35000"/>
+                  </a:schemeClr>
+                </a:solidFill>
+                <a:latin typeface="Avenir Book" panose="02000503020000020003" pitchFamily="2" charset="0"/>
+                <a:ea typeface="Calibri"/>
+                <a:cs typeface="Avenir Light"/>
+                <a:sym typeface="Calibri"/>
+              </a:rPr>
+              <a:t>creativecommons.org</a:t>
+            </a:r>
+            <a:r>
+              <a:rPr lang="de-DE" sz="800" dirty="0">
+                <a:solidFill>
+                  <a:schemeClr val="tx1">
+                    <a:lumMod val="65000"/>
+                    <a:lumOff val="35000"/>
+                  </a:schemeClr>
+                </a:solidFill>
+                <a:latin typeface="Avenir Book" panose="02000503020000020003" pitchFamily="2" charset="0"/>
+                <a:ea typeface="Calibri"/>
+                <a:cs typeface="Avenir Light"/>
+                <a:sym typeface="Calibri"/>
+              </a:rPr>
+              <a:t>/</a:t>
+            </a:r>
+            <a:r>
+              <a:rPr lang="de-DE" sz="800" dirty="0" err="1">
+                <a:solidFill>
+                  <a:schemeClr val="tx1">
+                    <a:lumMod val="65000"/>
+                    <a:lumOff val="35000"/>
+                  </a:schemeClr>
+                </a:solidFill>
+                <a:latin typeface="Avenir Book" panose="02000503020000020003" pitchFamily="2" charset="0"/>
+                <a:ea typeface="Calibri"/>
+                <a:cs typeface="Avenir Light"/>
+                <a:sym typeface="Calibri"/>
+              </a:rPr>
+              <a:t>licenses</a:t>
+            </a:r>
+            <a:r>
+              <a:rPr lang="de-DE" sz="800" dirty="0">
+                <a:solidFill>
+                  <a:schemeClr val="tx1">
+                    <a:lumMod val="65000"/>
+                    <a:lumOff val="35000"/>
+                  </a:schemeClr>
+                </a:solidFill>
+                <a:latin typeface="Avenir Book" panose="02000503020000020003" pitchFamily="2" charset="0"/>
+                <a:ea typeface="Calibri"/>
+                <a:cs typeface="Avenir Light"/>
+                <a:sym typeface="Calibri"/>
+              </a:rPr>
+              <a:t>/</a:t>
+            </a:r>
+            <a:r>
+              <a:rPr lang="de-DE" sz="800" dirty="0" err="1">
+                <a:solidFill>
+                  <a:schemeClr val="tx1">
+                    <a:lumMod val="65000"/>
+                    <a:lumOff val="35000"/>
+                  </a:schemeClr>
+                </a:solidFill>
+                <a:latin typeface="Avenir Book" panose="02000503020000020003" pitchFamily="2" charset="0"/>
+                <a:ea typeface="Calibri"/>
+                <a:cs typeface="Avenir Light"/>
+                <a:sym typeface="Calibri"/>
+              </a:rPr>
+              <a:t>by-nc</a:t>
+            </a:r>
+            <a:r>
+              <a:rPr lang="de-DE" sz="800" dirty="0">
+                <a:solidFill>
+                  <a:schemeClr val="tx1">
+                    <a:lumMod val="65000"/>
+                    <a:lumOff val="35000"/>
+                  </a:schemeClr>
+                </a:solidFill>
+                <a:latin typeface="Avenir Book" panose="02000503020000020003" pitchFamily="2" charset="0"/>
+                <a:ea typeface="Calibri"/>
+                <a:cs typeface="Avenir Light"/>
+                <a:sym typeface="Calibri"/>
+              </a:rPr>
+              <a:t>/4.0/</a:t>
+            </a:r>
+            <a:r>
+              <a:rPr lang="de-DE" sz="800" dirty="0" err="1">
+                <a:solidFill>
+                  <a:schemeClr val="tx1">
+                    <a:lumMod val="65000"/>
+                    <a:lumOff val="35000"/>
+                  </a:schemeClr>
+                </a:solidFill>
+                <a:latin typeface="Avenir Book" panose="02000503020000020003" pitchFamily="2" charset="0"/>
+                <a:ea typeface="Calibri"/>
+                <a:cs typeface="Avenir Light"/>
+                <a:sym typeface="Calibri"/>
+              </a:rPr>
+              <a:t>deed.de</a:t>
+            </a:r>
+            <a:endParaRPr sz="800" dirty="0">
+              <a:solidFill>
+                <a:schemeClr val="tx1">
+                  <a:lumMod val="65000"/>
+                  <a:lumOff val="35000"/>
+                </a:schemeClr>
+              </a:solidFill>
+              <a:latin typeface="Avenir Book" panose="02000503020000020003" pitchFamily="2" charset="0"/>
+              <a:ea typeface="Calibri"/>
+              <a:cs typeface="Avenir Light"/>
+              <a:sym typeface="Calibri"/>
+            </a:endParaRPr>
           </a:p>
         </p:txBody>
       </p:sp>
       <p:pic>
         <p:nvPicPr>
-          <p:cNvPr id="4" name="pasted-image.tif"/>
+          <p:cNvPr id="6" name="pasted-image.tif">
+            <a:extLst>
+              <a:ext uri="{FF2B5EF4-FFF2-40B4-BE49-F238E27FC236}">
+                <a16:creationId xmlns:a16="http://schemas.microsoft.com/office/drawing/2014/main" id="{23968A0B-038E-7068-89EB-891231FBE273}"/>
+              </a:ext>
+            </a:extLst>
+          </p:cNvPr>
           <p:cNvPicPr/>
           <p:nvPr/>
         </p:nvPicPr>
-        <p:blipFill>
-          <a:blip r:embed="rId3">
-            <a:extLst/>
-          </a:blip>
-          <a:stretch>
-            <a:fillRect/>
-          </a:stretch>
+        <p:blipFill rotWithShape="1">
+          <a:blip r:embed="rId2"/>
+          <a:srcRect r="24777" b="-3233"/>
+          <a:stretch/>
         </p:blipFill>
         <p:spPr>
           <a:xfrm>
-            <a:off x="6174185" y="4992838"/>
-            <a:ext cx="886619" cy="214128"/>
+            <a:off x="5724347" y="4733926"/>
+            <a:ext cx="1009828" cy="333374"/>
           </a:xfrm>
           <a:prstGeom prst="rect">
             <a:avLst/>

</xml_diff>